<commit_message>
added to the sudo code
</commit_message>
<xml_diff>
--- a/Notes/Structure Of Classes/Presentation1.pptx
+++ b/Notes/Structure Of Classes/Presentation1.pptx
@@ -243,7 +243,7 @@
           <a:p>
             <a:fld id="{58422A9E-B9C0-2C49-A767-9E1BBA9311F3}" type="datetimeFigureOut">
               <a:rPr lang="en-US" smtClean="0"/>
-              <a:t>3/3/18</a:t>
+              <a:t>3/7/18</a:t>
             </a:fld>
             <a:endParaRPr lang="en-US"/>
           </a:p>
@@ -411,7 +411,7 @@
           <a:p>
             <a:fld id="{58422A9E-B9C0-2C49-A767-9E1BBA9311F3}" type="datetimeFigureOut">
               <a:rPr lang="en-US" smtClean="0"/>
-              <a:t>3/3/18</a:t>
+              <a:t>3/7/18</a:t>
             </a:fld>
             <a:endParaRPr lang="en-US"/>
           </a:p>
@@ -589,7 +589,7 @@
           <a:p>
             <a:fld id="{58422A9E-B9C0-2C49-A767-9E1BBA9311F3}" type="datetimeFigureOut">
               <a:rPr lang="en-US" smtClean="0"/>
-              <a:t>3/3/18</a:t>
+              <a:t>3/7/18</a:t>
             </a:fld>
             <a:endParaRPr lang="en-US"/>
           </a:p>
@@ -757,7 +757,7 @@
           <a:p>
             <a:fld id="{58422A9E-B9C0-2C49-A767-9E1BBA9311F3}" type="datetimeFigureOut">
               <a:rPr lang="en-US" smtClean="0"/>
-              <a:t>3/3/18</a:t>
+              <a:t>3/7/18</a:t>
             </a:fld>
             <a:endParaRPr lang="en-US"/>
           </a:p>
@@ -1002,7 +1002,7 @@
           <a:p>
             <a:fld id="{58422A9E-B9C0-2C49-A767-9E1BBA9311F3}" type="datetimeFigureOut">
               <a:rPr lang="en-US" smtClean="0"/>
-              <a:t>3/3/18</a:t>
+              <a:t>3/7/18</a:t>
             </a:fld>
             <a:endParaRPr lang="en-US"/>
           </a:p>
@@ -1231,7 +1231,7 @@
           <a:p>
             <a:fld id="{58422A9E-B9C0-2C49-A767-9E1BBA9311F3}" type="datetimeFigureOut">
               <a:rPr lang="en-US" smtClean="0"/>
-              <a:t>3/3/18</a:t>
+              <a:t>3/7/18</a:t>
             </a:fld>
             <a:endParaRPr lang="en-US"/>
           </a:p>
@@ -1595,7 +1595,7 @@
           <a:p>
             <a:fld id="{58422A9E-B9C0-2C49-A767-9E1BBA9311F3}" type="datetimeFigureOut">
               <a:rPr lang="en-US" smtClean="0"/>
-              <a:t>3/3/18</a:t>
+              <a:t>3/7/18</a:t>
             </a:fld>
             <a:endParaRPr lang="en-US"/>
           </a:p>
@@ -1712,7 +1712,7 @@
           <a:p>
             <a:fld id="{58422A9E-B9C0-2C49-A767-9E1BBA9311F3}" type="datetimeFigureOut">
               <a:rPr lang="en-US" smtClean="0"/>
-              <a:t>3/3/18</a:t>
+              <a:t>3/7/18</a:t>
             </a:fld>
             <a:endParaRPr lang="en-US"/>
           </a:p>
@@ -1807,7 +1807,7 @@
           <a:p>
             <a:fld id="{58422A9E-B9C0-2C49-A767-9E1BBA9311F3}" type="datetimeFigureOut">
               <a:rPr lang="en-US" smtClean="0"/>
-              <a:t>3/3/18</a:t>
+              <a:t>3/7/18</a:t>
             </a:fld>
             <a:endParaRPr lang="en-US"/>
           </a:p>
@@ -2082,7 +2082,7 @@
           <a:p>
             <a:fld id="{58422A9E-B9C0-2C49-A767-9E1BBA9311F3}" type="datetimeFigureOut">
               <a:rPr lang="en-US" smtClean="0"/>
-              <a:t>3/3/18</a:t>
+              <a:t>3/7/18</a:t>
             </a:fld>
             <a:endParaRPr lang="en-US"/>
           </a:p>
@@ -2334,7 +2334,7 @@
           <a:p>
             <a:fld id="{58422A9E-B9C0-2C49-A767-9E1BBA9311F3}" type="datetimeFigureOut">
               <a:rPr lang="en-US" smtClean="0"/>
-              <a:t>3/3/18</a:t>
+              <a:t>3/7/18</a:t>
             </a:fld>
             <a:endParaRPr lang="en-US"/>
           </a:p>
@@ -2545,7 +2545,7 @@
           <a:p>
             <a:fld id="{58422A9E-B9C0-2C49-A767-9E1BBA9311F3}" type="datetimeFigureOut">
               <a:rPr lang="en-US" smtClean="0"/>
-              <a:t>3/3/18</a:t>
+              <a:t>3/7/18</a:t>
             </a:fld>
             <a:endParaRPr lang="en-US"/>
           </a:p>
@@ -2950,43 +2950,6 @@
           <a:chExt cx="0" cy="0"/>
         </a:xfrm>
       </p:grpSpPr>
-      <p:cxnSp>
-        <p:nvCxnSpPr>
-          <p:cNvPr id="6" name="Straight Arrow Connector 5"/>
-          <p:cNvCxnSpPr>
-            <a:cxnSpLocks/>
-            <a:endCxn id="7" idx="2"/>
-          </p:cNvCxnSpPr>
-          <p:nvPr/>
-        </p:nvCxnSpPr>
-        <p:spPr>
-          <a:xfrm flipV="1">
-            <a:off x="1298666" y="4457566"/>
-            <a:ext cx="8708" cy="566056"/>
-          </a:xfrm>
-          <a:prstGeom prst="straightConnector1">
-            <a:avLst/>
-          </a:prstGeom>
-          <a:ln>
-            <a:headEnd type="triangle"/>
-            <a:tailEnd type="triangle"/>
-          </a:ln>
-        </p:spPr>
-        <p:style>
-          <a:lnRef idx="1">
-            <a:schemeClr val="accent1"/>
-          </a:lnRef>
-          <a:fillRef idx="0">
-            <a:schemeClr val="accent1"/>
-          </a:fillRef>
-          <a:effectRef idx="0">
-            <a:schemeClr val="accent1"/>
-          </a:effectRef>
-          <a:fontRef idx="minor">
-            <a:schemeClr val="tx1"/>
-          </a:fontRef>
-        </p:style>
-      </p:cxnSp>
       <p:sp>
         <p:nvSpPr>
           <p:cNvPr id="7" name="Rectangle 6"/>
@@ -3032,56 +2995,13 @@
       </p:sp>
       <p:sp>
         <p:nvSpPr>
-          <p:cNvPr id="8" name="Rectangle 7"/>
-          <p:cNvSpPr/>
-          <p:nvPr/>
-        </p:nvSpPr>
-        <p:spPr>
-          <a:xfrm>
-            <a:off x="569322" y="5014914"/>
-            <a:ext cx="1547949" cy="618308"/>
-          </a:xfrm>
-          <a:prstGeom prst="rect">
-            <a:avLst/>
-          </a:prstGeom>
-        </p:spPr>
-        <p:style>
-          <a:lnRef idx="2">
-            <a:schemeClr val="accent1">
-              <a:shade val="50000"/>
-            </a:schemeClr>
-          </a:lnRef>
-          <a:fillRef idx="1">
-            <a:schemeClr val="accent1"/>
-          </a:fillRef>
-          <a:effectRef idx="0">
-            <a:schemeClr val="accent1"/>
-          </a:effectRef>
-          <a:fontRef idx="minor">
-            <a:schemeClr val="lt1"/>
-          </a:fontRef>
-        </p:style>
-        <p:txBody>
-          <a:bodyPr rtlCol="0" anchor="ctr"/>
-          <a:lstStyle/>
-          <a:p>
-            <a:pPr algn="ctr"/>
-            <a:r>
-              <a:rPr lang="en-US" dirty="0"/>
-              <a:t>Controller</a:t>
-            </a:r>
-          </a:p>
-        </p:txBody>
-      </p:sp>
-      <p:sp>
-        <p:nvSpPr>
           <p:cNvPr id="9" name="Rectangle 8"/>
           <p:cNvSpPr/>
           <p:nvPr/>
         </p:nvSpPr>
         <p:spPr>
           <a:xfrm>
-            <a:off x="2778034" y="6147026"/>
+            <a:off x="2117271" y="5666080"/>
             <a:ext cx="1547949" cy="470263"/>
           </a:xfrm>
           <a:prstGeom prst="rect">
@@ -3120,15 +3040,16 @@
         <p:nvCxnSpPr>
           <p:cNvPr id="14" name="Straight Arrow Connector 13"/>
           <p:cNvCxnSpPr>
+            <a:cxnSpLocks/>
             <a:stCxn id="9" idx="0"/>
-            <a:endCxn id="8" idx="2"/>
+            <a:endCxn id="7" idx="2"/>
           </p:cNvCxnSpPr>
           <p:nvPr/>
         </p:nvCxnSpPr>
         <p:spPr>
           <a:xfrm flipH="1" flipV="1">
-            <a:off x="1343297" y="5633222"/>
-            <a:ext cx="2208712" cy="513804"/>
+            <a:off x="1307374" y="4457566"/>
+            <a:ext cx="1583872" cy="1208514"/>
           </a:xfrm>
           <a:prstGeom prst="straightConnector1">
             <a:avLst/>
@@ -3161,7 +3082,7 @@
         </p:nvSpPr>
         <p:spPr>
           <a:xfrm>
-            <a:off x="5004163" y="6155735"/>
+            <a:off x="4343400" y="5674789"/>
             <a:ext cx="1502229" cy="470263"/>
           </a:xfrm>
           <a:prstGeom prst="rect">
@@ -3208,7 +3129,7 @@
         </p:nvCxnSpPr>
         <p:spPr>
           <a:xfrm flipH="1" flipV="1">
-            <a:off x="4325983" y="6382158"/>
+            <a:off x="3665220" y="5901212"/>
             <a:ext cx="678180" cy="8709"/>
           </a:xfrm>
           <a:prstGeom prst="straightConnector1">
@@ -3241,7 +3162,7 @@
         </p:nvSpPr>
         <p:spPr>
           <a:xfrm>
-            <a:off x="480060" y="6147026"/>
+            <a:off x="-180703" y="5666080"/>
             <a:ext cx="1619794" cy="478972"/>
           </a:xfrm>
           <a:prstGeom prst="rect">
@@ -3288,7 +3209,7 @@
         </p:nvCxnSpPr>
         <p:spPr>
           <a:xfrm flipV="1">
-            <a:off x="2099854" y="6382158"/>
+            <a:off x="1439091" y="5901212"/>
             <a:ext cx="678180" cy="4354"/>
           </a:xfrm>
           <a:prstGeom prst="straightConnector1">
@@ -8686,1593 +8607,6 @@
           </a:p>
         </p:txBody>
       </p:sp>
-      <p:sp>
-        <p:nvSpPr>
-          <p:cNvPr id="27" name="Freeform 26">
-            <a:extLst>
-              <a:ext uri="{FF2B5EF4-FFF2-40B4-BE49-F238E27FC236}">
-                <a16:creationId xmlns:a16="http://schemas.microsoft.com/office/drawing/2014/main" id="{2661A77A-A134-EC49-AF9B-54176340C576}"/>
-              </a:ext>
-            </a:extLst>
-          </p:cNvPr>
-          <p:cNvSpPr/>
-          <p:nvPr/>
-        </p:nvSpPr>
-        <p:spPr>
-          <a:xfrm>
-            <a:off x="324196" y="4696691"/>
-            <a:ext cx="6494710" cy="1995054"/>
-          </a:xfrm>
-          <a:custGeom>
-            <a:avLst/>
-            <a:gdLst>
-              <a:gd name="connsiteX0" fmla="*/ 1828800 w 6494710"/>
-              <a:gd name="connsiteY0" fmla="*/ 0 h 1995054"/>
-              <a:gd name="connsiteX1" fmla="*/ 1770611 w 6494710"/>
-              <a:gd name="connsiteY1" fmla="*/ 58189 h 1995054"/>
-              <a:gd name="connsiteX2" fmla="*/ 1737360 w 6494710"/>
-              <a:gd name="connsiteY2" fmla="*/ 66502 h 1995054"/>
-              <a:gd name="connsiteX3" fmla="*/ 1687484 w 6494710"/>
-              <a:gd name="connsiteY3" fmla="*/ 83127 h 1995054"/>
-              <a:gd name="connsiteX4" fmla="*/ 1662546 w 6494710"/>
-              <a:gd name="connsiteY4" fmla="*/ 91440 h 1995054"/>
-              <a:gd name="connsiteX5" fmla="*/ 1596044 w 6494710"/>
-              <a:gd name="connsiteY5" fmla="*/ 133004 h 1995054"/>
-              <a:gd name="connsiteX6" fmla="*/ 1504604 w 6494710"/>
-              <a:gd name="connsiteY6" fmla="*/ 166254 h 1995054"/>
-              <a:gd name="connsiteX7" fmla="*/ 1471353 w 6494710"/>
-              <a:gd name="connsiteY7" fmla="*/ 174567 h 1995054"/>
-              <a:gd name="connsiteX8" fmla="*/ 1388226 w 6494710"/>
-              <a:gd name="connsiteY8" fmla="*/ 207818 h 1995054"/>
-              <a:gd name="connsiteX9" fmla="*/ 1330037 w 6494710"/>
-              <a:gd name="connsiteY9" fmla="*/ 224444 h 1995054"/>
-              <a:gd name="connsiteX10" fmla="*/ 1296786 w 6494710"/>
-              <a:gd name="connsiteY10" fmla="*/ 232756 h 1995054"/>
-              <a:gd name="connsiteX11" fmla="*/ 1255222 w 6494710"/>
-              <a:gd name="connsiteY11" fmla="*/ 249382 h 1995054"/>
-              <a:gd name="connsiteX12" fmla="*/ 1230284 w 6494710"/>
-              <a:gd name="connsiteY12" fmla="*/ 266007 h 1995054"/>
-              <a:gd name="connsiteX13" fmla="*/ 1188720 w 6494710"/>
-              <a:gd name="connsiteY13" fmla="*/ 274320 h 1995054"/>
-              <a:gd name="connsiteX14" fmla="*/ 1122219 w 6494710"/>
-              <a:gd name="connsiteY14" fmla="*/ 290945 h 1995054"/>
-              <a:gd name="connsiteX15" fmla="*/ 1055717 w 6494710"/>
-              <a:gd name="connsiteY15" fmla="*/ 299258 h 1995054"/>
-              <a:gd name="connsiteX16" fmla="*/ 997528 w 6494710"/>
-              <a:gd name="connsiteY16" fmla="*/ 307571 h 1995054"/>
-              <a:gd name="connsiteX17" fmla="*/ 299259 w 6494710"/>
-              <a:gd name="connsiteY17" fmla="*/ 299258 h 1995054"/>
-              <a:gd name="connsiteX18" fmla="*/ 133004 w 6494710"/>
-              <a:gd name="connsiteY18" fmla="*/ 299258 h 1995054"/>
-              <a:gd name="connsiteX19" fmla="*/ 108066 w 6494710"/>
-              <a:gd name="connsiteY19" fmla="*/ 307571 h 1995054"/>
-              <a:gd name="connsiteX20" fmla="*/ 74815 w 6494710"/>
-              <a:gd name="connsiteY20" fmla="*/ 349134 h 1995054"/>
-              <a:gd name="connsiteX21" fmla="*/ 49877 w 6494710"/>
-              <a:gd name="connsiteY21" fmla="*/ 440574 h 1995054"/>
-              <a:gd name="connsiteX22" fmla="*/ 24939 w 6494710"/>
-              <a:gd name="connsiteY22" fmla="*/ 498764 h 1995054"/>
-              <a:gd name="connsiteX23" fmla="*/ 8313 w 6494710"/>
-              <a:gd name="connsiteY23" fmla="*/ 565265 h 1995054"/>
-              <a:gd name="connsiteX24" fmla="*/ 0 w 6494710"/>
-              <a:gd name="connsiteY24" fmla="*/ 1197033 h 1995054"/>
-              <a:gd name="connsiteX25" fmla="*/ 8313 w 6494710"/>
-              <a:gd name="connsiteY25" fmla="*/ 1396538 h 1995054"/>
-              <a:gd name="connsiteX26" fmla="*/ 24939 w 6494710"/>
-              <a:gd name="connsiteY26" fmla="*/ 1487978 h 1995054"/>
-              <a:gd name="connsiteX27" fmla="*/ 33251 w 6494710"/>
-              <a:gd name="connsiteY27" fmla="*/ 1828800 h 1995054"/>
-              <a:gd name="connsiteX28" fmla="*/ 41564 w 6494710"/>
-              <a:gd name="connsiteY28" fmla="*/ 1895302 h 1995054"/>
-              <a:gd name="connsiteX29" fmla="*/ 83128 w 6494710"/>
-              <a:gd name="connsiteY29" fmla="*/ 1936865 h 1995054"/>
-              <a:gd name="connsiteX30" fmla="*/ 108066 w 6494710"/>
-              <a:gd name="connsiteY30" fmla="*/ 1953491 h 1995054"/>
-              <a:gd name="connsiteX31" fmla="*/ 133004 w 6494710"/>
-              <a:gd name="connsiteY31" fmla="*/ 1961804 h 1995054"/>
-              <a:gd name="connsiteX32" fmla="*/ 224444 w 6494710"/>
-              <a:gd name="connsiteY32" fmla="*/ 1978429 h 1995054"/>
-              <a:gd name="connsiteX33" fmla="*/ 324197 w 6494710"/>
-              <a:gd name="connsiteY33" fmla="*/ 1995054 h 1995054"/>
-              <a:gd name="connsiteX34" fmla="*/ 648393 w 6494710"/>
-              <a:gd name="connsiteY34" fmla="*/ 1986742 h 1995054"/>
-              <a:gd name="connsiteX35" fmla="*/ 681644 w 6494710"/>
-              <a:gd name="connsiteY35" fmla="*/ 1978429 h 1995054"/>
-              <a:gd name="connsiteX36" fmla="*/ 806335 w 6494710"/>
-              <a:gd name="connsiteY36" fmla="*/ 1953491 h 1995054"/>
-              <a:gd name="connsiteX37" fmla="*/ 847899 w 6494710"/>
-              <a:gd name="connsiteY37" fmla="*/ 1945178 h 1995054"/>
-              <a:gd name="connsiteX38" fmla="*/ 1512917 w 6494710"/>
-              <a:gd name="connsiteY38" fmla="*/ 1936865 h 1995054"/>
-              <a:gd name="connsiteX39" fmla="*/ 1629295 w 6494710"/>
-              <a:gd name="connsiteY39" fmla="*/ 1920240 h 1995054"/>
-              <a:gd name="connsiteX40" fmla="*/ 1670859 w 6494710"/>
-              <a:gd name="connsiteY40" fmla="*/ 1911927 h 1995054"/>
-              <a:gd name="connsiteX41" fmla="*/ 1828800 w 6494710"/>
-              <a:gd name="connsiteY41" fmla="*/ 1903614 h 1995054"/>
-              <a:gd name="connsiteX42" fmla="*/ 2053244 w 6494710"/>
-              <a:gd name="connsiteY42" fmla="*/ 1886989 h 1995054"/>
-              <a:gd name="connsiteX43" fmla="*/ 2161309 w 6494710"/>
-              <a:gd name="connsiteY43" fmla="*/ 1870364 h 1995054"/>
-              <a:gd name="connsiteX44" fmla="*/ 2202873 w 6494710"/>
-              <a:gd name="connsiteY44" fmla="*/ 1862051 h 1995054"/>
-              <a:gd name="connsiteX45" fmla="*/ 2286000 w 6494710"/>
-              <a:gd name="connsiteY45" fmla="*/ 1853738 h 1995054"/>
-              <a:gd name="connsiteX46" fmla="*/ 2535382 w 6494710"/>
-              <a:gd name="connsiteY46" fmla="*/ 1862051 h 1995054"/>
-              <a:gd name="connsiteX47" fmla="*/ 2560320 w 6494710"/>
-              <a:gd name="connsiteY47" fmla="*/ 1870364 h 1995054"/>
-              <a:gd name="connsiteX48" fmla="*/ 2635135 w 6494710"/>
-              <a:gd name="connsiteY48" fmla="*/ 1886989 h 1995054"/>
-              <a:gd name="connsiteX49" fmla="*/ 2701637 w 6494710"/>
-              <a:gd name="connsiteY49" fmla="*/ 1903614 h 1995054"/>
-              <a:gd name="connsiteX50" fmla="*/ 2734888 w 6494710"/>
-              <a:gd name="connsiteY50" fmla="*/ 1911927 h 1995054"/>
-              <a:gd name="connsiteX51" fmla="*/ 2834640 w 6494710"/>
-              <a:gd name="connsiteY51" fmla="*/ 1928553 h 1995054"/>
-              <a:gd name="connsiteX52" fmla="*/ 2992582 w 6494710"/>
-              <a:gd name="connsiteY52" fmla="*/ 1920240 h 1995054"/>
-              <a:gd name="connsiteX53" fmla="*/ 3034146 w 6494710"/>
-              <a:gd name="connsiteY53" fmla="*/ 1903614 h 1995054"/>
-              <a:gd name="connsiteX54" fmla="*/ 3092335 w 6494710"/>
-              <a:gd name="connsiteY54" fmla="*/ 1895302 h 1995054"/>
-              <a:gd name="connsiteX55" fmla="*/ 3125586 w 6494710"/>
-              <a:gd name="connsiteY55" fmla="*/ 1886989 h 1995054"/>
-              <a:gd name="connsiteX56" fmla="*/ 3350029 w 6494710"/>
-              <a:gd name="connsiteY56" fmla="*/ 1870364 h 1995054"/>
-              <a:gd name="connsiteX57" fmla="*/ 3433157 w 6494710"/>
-              <a:gd name="connsiteY57" fmla="*/ 1862051 h 1995054"/>
-              <a:gd name="connsiteX58" fmla="*/ 3466408 w 6494710"/>
-              <a:gd name="connsiteY58" fmla="*/ 1853738 h 1995054"/>
-              <a:gd name="connsiteX59" fmla="*/ 3507971 w 6494710"/>
-              <a:gd name="connsiteY59" fmla="*/ 1845425 h 1995054"/>
-              <a:gd name="connsiteX60" fmla="*/ 3599411 w 6494710"/>
-              <a:gd name="connsiteY60" fmla="*/ 1820487 h 1995054"/>
-              <a:gd name="connsiteX61" fmla="*/ 3707477 w 6494710"/>
-              <a:gd name="connsiteY61" fmla="*/ 1770611 h 1995054"/>
-              <a:gd name="connsiteX62" fmla="*/ 3749040 w 6494710"/>
-              <a:gd name="connsiteY62" fmla="*/ 1753985 h 1995054"/>
-              <a:gd name="connsiteX63" fmla="*/ 3815542 w 6494710"/>
-              <a:gd name="connsiteY63" fmla="*/ 1712422 h 1995054"/>
-              <a:gd name="connsiteX64" fmla="*/ 3915295 w 6494710"/>
-              <a:gd name="connsiteY64" fmla="*/ 1753985 h 1995054"/>
-              <a:gd name="connsiteX65" fmla="*/ 3956859 w 6494710"/>
-              <a:gd name="connsiteY65" fmla="*/ 1778924 h 1995054"/>
-              <a:gd name="connsiteX66" fmla="*/ 3981797 w 6494710"/>
-              <a:gd name="connsiteY66" fmla="*/ 1795549 h 1995054"/>
-              <a:gd name="connsiteX67" fmla="*/ 4015048 w 6494710"/>
-              <a:gd name="connsiteY67" fmla="*/ 1803862 h 1995054"/>
-              <a:gd name="connsiteX68" fmla="*/ 4073237 w 6494710"/>
-              <a:gd name="connsiteY68" fmla="*/ 1828800 h 1995054"/>
-              <a:gd name="connsiteX69" fmla="*/ 4131426 w 6494710"/>
-              <a:gd name="connsiteY69" fmla="*/ 1845425 h 1995054"/>
-              <a:gd name="connsiteX70" fmla="*/ 4222866 w 6494710"/>
-              <a:gd name="connsiteY70" fmla="*/ 1886989 h 1995054"/>
-              <a:gd name="connsiteX71" fmla="*/ 4256117 w 6494710"/>
-              <a:gd name="connsiteY71" fmla="*/ 1895302 h 1995054"/>
-              <a:gd name="connsiteX72" fmla="*/ 4330931 w 6494710"/>
-              <a:gd name="connsiteY72" fmla="*/ 1911927 h 1995054"/>
-              <a:gd name="connsiteX73" fmla="*/ 4447309 w 6494710"/>
-              <a:gd name="connsiteY73" fmla="*/ 1903614 h 1995054"/>
-              <a:gd name="connsiteX74" fmla="*/ 4480560 w 6494710"/>
-              <a:gd name="connsiteY74" fmla="*/ 1895302 h 1995054"/>
-              <a:gd name="connsiteX75" fmla="*/ 4563688 w 6494710"/>
-              <a:gd name="connsiteY75" fmla="*/ 1878676 h 1995054"/>
-              <a:gd name="connsiteX76" fmla="*/ 4638502 w 6494710"/>
-              <a:gd name="connsiteY76" fmla="*/ 1862051 h 1995054"/>
-              <a:gd name="connsiteX77" fmla="*/ 4862946 w 6494710"/>
-              <a:gd name="connsiteY77" fmla="*/ 1845425 h 1995054"/>
-              <a:gd name="connsiteX78" fmla="*/ 5054139 w 6494710"/>
-              <a:gd name="connsiteY78" fmla="*/ 1828800 h 1995054"/>
-              <a:gd name="connsiteX79" fmla="*/ 5444837 w 6494710"/>
-              <a:gd name="connsiteY79" fmla="*/ 1845425 h 1995054"/>
-              <a:gd name="connsiteX80" fmla="*/ 5469775 w 6494710"/>
-              <a:gd name="connsiteY80" fmla="*/ 1862051 h 1995054"/>
-              <a:gd name="connsiteX81" fmla="*/ 5494713 w 6494710"/>
-              <a:gd name="connsiteY81" fmla="*/ 1870364 h 1995054"/>
-              <a:gd name="connsiteX82" fmla="*/ 5519651 w 6494710"/>
-              <a:gd name="connsiteY82" fmla="*/ 1886989 h 1995054"/>
-              <a:gd name="connsiteX83" fmla="*/ 5552902 w 6494710"/>
-              <a:gd name="connsiteY83" fmla="*/ 1895302 h 1995054"/>
-              <a:gd name="connsiteX84" fmla="*/ 5652655 w 6494710"/>
-              <a:gd name="connsiteY84" fmla="*/ 1920240 h 1995054"/>
-              <a:gd name="connsiteX85" fmla="*/ 5694219 w 6494710"/>
-              <a:gd name="connsiteY85" fmla="*/ 1936865 h 1995054"/>
-              <a:gd name="connsiteX86" fmla="*/ 5910349 w 6494710"/>
-              <a:gd name="connsiteY86" fmla="*/ 1936865 h 1995054"/>
-              <a:gd name="connsiteX87" fmla="*/ 5935288 w 6494710"/>
-              <a:gd name="connsiteY87" fmla="*/ 1920240 h 1995054"/>
-              <a:gd name="connsiteX88" fmla="*/ 6010102 w 6494710"/>
-              <a:gd name="connsiteY88" fmla="*/ 1878676 h 1995054"/>
-              <a:gd name="connsiteX89" fmla="*/ 6109855 w 6494710"/>
-              <a:gd name="connsiteY89" fmla="*/ 1870364 h 1995054"/>
-              <a:gd name="connsiteX90" fmla="*/ 6425739 w 6494710"/>
-              <a:gd name="connsiteY90" fmla="*/ 1862051 h 1995054"/>
-              <a:gd name="connsiteX91" fmla="*/ 6450677 w 6494710"/>
-              <a:gd name="connsiteY91" fmla="*/ 1845425 h 1995054"/>
-              <a:gd name="connsiteX92" fmla="*/ 6492240 w 6494710"/>
-              <a:gd name="connsiteY92" fmla="*/ 1820487 h 1995054"/>
-              <a:gd name="connsiteX93" fmla="*/ 6483928 w 6494710"/>
-              <a:gd name="connsiteY93" fmla="*/ 1745673 h 1995054"/>
-              <a:gd name="connsiteX94" fmla="*/ 6475615 w 6494710"/>
-              <a:gd name="connsiteY94" fmla="*/ 1463040 h 1995054"/>
-              <a:gd name="connsiteX95" fmla="*/ 6450677 w 6494710"/>
-              <a:gd name="connsiteY95" fmla="*/ 1371600 h 1995054"/>
-              <a:gd name="connsiteX96" fmla="*/ 6434051 w 6494710"/>
-              <a:gd name="connsiteY96" fmla="*/ 1346662 h 1995054"/>
-              <a:gd name="connsiteX97" fmla="*/ 6425739 w 6494710"/>
-              <a:gd name="connsiteY97" fmla="*/ 1321724 h 1995054"/>
-              <a:gd name="connsiteX98" fmla="*/ 6384175 w 6494710"/>
-              <a:gd name="connsiteY98" fmla="*/ 1288473 h 1995054"/>
-              <a:gd name="connsiteX99" fmla="*/ 6359237 w 6494710"/>
-              <a:gd name="connsiteY99" fmla="*/ 1280160 h 1995054"/>
-              <a:gd name="connsiteX100" fmla="*/ 6317673 w 6494710"/>
-              <a:gd name="connsiteY100" fmla="*/ 1263534 h 1995054"/>
-              <a:gd name="connsiteX101" fmla="*/ 5694219 w 6494710"/>
-              <a:gd name="connsiteY101" fmla="*/ 1271847 h 1995054"/>
-              <a:gd name="connsiteX102" fmla="*/ 5461462 w 6494710"/>
-              <a:gd name="connsiteY102" fmla="*/ 1305098 h 1995054"/>
-              <a:gd name="connsiteX103" fmla="*/ 5386648 w 6494710"/>
-              <a:gd name="connsiteY103" fmla="*/ 1313411 h 1995054"/>
-              <a:gd name="connsiteX104" fmla="*/ 5320146 w 6494710"/>
-              <a:gd name="connsiteY104" fmla="*/ 1321724 h 1995054"/>
-              <a:gd name="connsiteX105" fmla="*/ 5203768 w 6494710"/>
-              <a:gd name="connsiteY105" fmla="*/ 1346662 h 1995054"/>
-              <a:gd name="connsiteX106" fmla="*/ 5079077 w 6494710"/>
-              <a:gd name="connsiteY106" fmla="*/ 1371600 h 1995054"/>
-              <a:gd name="connsiteX107" fmla="*/ 4954386 w 6494710"/>
-              <a:gd name="connsiteY107" fmla="*/ 1354974 h 1995054"/>
-              <a:gd name="connsiteX108" fmla="*/ 4929448 w 6494710"/>
-              <a:gd name="connsiteY108" fmla="*/ 1346662 h 1995054"/>
-              <a:gd name="connsiteX109" fmla="*/ 4887884 w 6494710"/>
-              <a:gd name="connsiteY109" fmla="*/ 1338349 h 1995054"/>
-              <a:gd name="connsiteX110" fmla="*/ 4862946 w 6494710"/>
-              <a:gd name="connsiteY110" fmla="*/ 1330036 h 1995054"/>
-              <a:gd name="connsiteX111" fmla="*/ 4746568 w 6494710"/>
-              <a:gd name="connsiteY111" fmla="*/ 1321724 h 1995054"/>
-              <a:gd name="connsiteX112" fmla="*/ 4696691 w 6494710"/>
-              <a:gd name="connsiteY112" fmla="*/ 1305098 h 1995054"/>
-              <a:gd name="connsiteX113" fmla="*/ 4547062 w 6494710"/>
-              <a:gd name="connsiteY113" fmla="*/ 1255222 h 1995054"/>
-              <a:gd name="connsiteX114" fmla="*/ 4414059 w 6494710"/>
-              <a:gd name="connsiteY114" fmla="*/ 1197033 h 1995054"/>
-              <a:gd name="connsiteX115" fmla="*/ 4347557 w 6494710"/>
-              <a:gd name="connsiteY115" fmla="*/ 1163782 h 1995054"/>
-              <a:gd name="connsiteX116" fmla="*/ 4272742 w 6494710"/>
-              <a:gd name="connsiteY116" fmla="*/ 1138844 h 1995054"/>
-              <a:gd name="connsiteX117" fmla="*/ 4197928 w 6494710"/>
-              <a:gd name="connsiteY117" fmla="*/ 1105593 h 1995054"/>
-              <a:gd name="connsiteX118" fmla="*/ 4031673 w 6494710"/>
-              <a:gd name="connsiteY118" fmla="*/ 1047404 h 1995054"/>
-              <a:gd name="connsiteX119" fmla="*/ 3857106 w 6494710"/>
-              <a:gd name="connsiteY119" fmla="*/ 980902 h 1995054"/>
-              <a:gd name="connsiteX120" fmla="*/ 3765666 w 6494710"/>
-              <a:gd name="connsiteY120" fmla="*/ 939338 h 1995054"/>
-              <a:gd name="connsiteX121" fmla="*/ 3632662 w 6494710"/>
-              <a:gd name="connsiteY121" fmla="*/ 889462 h 1995054"/>
-              <a:gd name="connsiteX122" fmla="*/ 3516284 w 6494710"/>
-              <a:gd name="connsiteY122" fmla="*/ 839585 h 1995054"/>
-              <a:gd name="connsiteX123" fmla="*/ 3491346 w 6494710"/>
-              <a:gd name="connsiteY123" fmla="*/ 831273 h 1995054"/>
-              <a:gd name="connsiteX124" fmla="*/ 3416531 w 6494710"/>
-              <a:gd name="connsiteY124" fmla="*/ 798022 h 1995054"/>
-              <a:gd name="connsiteX125" fmla="*/ 3391593 w 6494710"/>
-              <a:gd name="connsiteY125" fmla="*/ 789709 h 1995054"/>
-              <a:gd name="connsiteX126" fmla="*/ 3366655 w 6494710"/>
-              <a:gd name="connsiteY126" fmla="*/ 773084 h 1995054"/>
-              <a:gd name="connsiteX127" fmla="*/ 3300153 w 6494710"/>
-              <a:gd name="connsiteY127" fmla="*/ 756458 h 1995054"/>
-              <a:gd name="connsiteX128" fmla="*/ 3250277 w 6494710"/>
-              <a:gd name="connsiteY128" fmla="*/ 739833 h 1995054"/>
-              <a:gd name="connsiteX129" fmla="*/ 3200400 w 6494710"/>
-              <a:gd name="connsiteY129" fmla="*/ 714894 h 1995054"/>
-              <a:gd name="connsiteX130" fmla="*/ 3175462 w 6494710"/>
-              <a:gd name="connsiteY130" fmla="*/ 698269 h 1995054"/>
-              <a:gd name="connsiteX131" fmla="*/ 3108960 w 6494710"/>
-              <a:gd name="connsiteY131" fmla="*/ 665018 h 1995054"/>
-              <a:gd name="connsiteX132" fmla="*/ 3042459 w 6494710"/>
-              <a:gd name="connsiteY132" fmla="*/ 623454 h 1995054"/>
-              <a:gd name="connsiteX133" fmla="*/ 2959331 w 6494710"/>
-              <a:gd name="connsiteY133" fmla="*/ 573578 h 1995054"/>
-              <a:gd name="connsiteX134" fmla="*/ 2926080 w 6494710"/>
-              <a:gd name="connsiteY134" fmla="*/ 565265 h 1995054"/>
-              <a:gd name="connsiteX135" fmla="*/ 2901142 w 6494710"/>
-              <a:gd name="connsiteY135" fmla="*/ 556953 h 1995054"/>
-              <a:gd name="connsiteX136" fmla="*/ 2867891 w 6494710"/>
-              <a:gd name="connsiteY136" fmla="*/ 548640 h 1995054"/>
-              <a:gd name="connsiteX137" fmla="*/ 2826328 w 6494710"/>
-              <a:gd name="connsiteY137" fmla="*/ 532014 h 1995054"/>
-              <a:gd name="connsiteX138" fmla="*/ 2759826 w 6494710"/>
-              <a:gd name="connsiteY138" fmla="*/ 498764 h 1995054"/>
-              <a:gd name="connsiteX139" fmla="*/ 2693324 w 6494710"/>
-              <a:gd name="connsiteY139" fmla="*/ 473825 h 1995054"/>
-              <a:gd name="connsiteX140" fmla="*/ 2660073 w 6494710"/>
-              <a:gd name="connsiteY140" fmla="*/ 465513 h 1995054"/>
-              <a:gd name="connsiteX141" fmla="*/ 2635135 w 6494710"/>
-              <a:gd name="connsiteY141" fmla="*/ 448887 h 1995054"/>
-              <a:gd name="connsiteX142" fmla="*/ 2552008 w 6494710"/>
-              <a:gd name="connsiteY142" fmla="*/ 415636 h 1995054"/>
-              <a:gd name="connsiteX143" fmla="*/ 2477193 w 6494710"/>
-              <a:gd name="connsiteY143" fmla="*/ 357447 h 1995054"/>
-              <a:gd name="connsiteX144" fmla="*/ 2419004 w 6494710"/>
-              <a:gd name="connsiteY144" fmla="*/ 324196 h 1995054"/>
-              <a:gd name="connsiteX145" fmla="*/ 2352502 w 6494710"/>
-              <a:gd name="connsiteY145" fmla="*/ 274320 h 1995054"/>
-              <a:gd name="connsiteX146" fmla="*/ 2327564 w 6494710"/>
-              <a:gd name="connsiteY146" fmla="*/ 266007 h 1995054"/>
-              <a:gd name="connsiteX147" fmla="*/ 2269375 w 6494710"/>
-              <a:gd name="connsiteY147" fmla="*/ 224444 h 1995054"/>
-              <a:gd name="connsiteX148" fmla="*/ 2211186 w 6494710"/>
-              <a:gd name="connsiteY148" fmla="*/ 207818 h 1995054"/>
-              <a:gd name="connsiteX149" fmla="*/ 2186248 w 6494710"/>
-              <a:gd name="connsiteY149" fmla="*/ 191193 h 1995054"/>
-              <a:gd name="connsiteX150" fmla="*/ 2086495 w 6494710"/>
-              <a:gd name="connsiteY150" fmla="*/ 174567 h 1995054"/>
-              <a:gd name="connsiteX151" fmla="*/ 1995055 w 6494710"/>
-              <a:gd name="connsiteY151" fmla="*/ 157942 h 1995054"/>
-              <a:gd name="connsiteX152" fmla="*/ 1928553 w 6494710"/>
-              <a:gd name="connsiteY152" fmla="*/ 141316 h 1995054"/>
-              <a:gd name="connsiteX153" fmla="*/ 1745673 w 6494710"/>
-              <a:gd name="connsiteY153" fmla="*/ 133004 h 1995054"/>
-              <a:gd name="connsiteX154" fmla="*/ 1687484 w 6494710"/>
-              <a:gd name="connsiteY154" fmla="*/ 157942 h 1995054"/>
-            </a:gdLst>
-            <a:ahLst/>
-            <a:cxnLst>
-              <a:cxn ang="0">
-                <a:pos x="connsiteX0" y="connsiteY0"/>
-              </a:cxn>
-              <a:cxn ang="0">
-                <a:pos x="connsiteX1" y="connsiteY1"/>
-              </a:cxn>
-              <a:cxn ang="0">
-                <a:pos x="connsiteX2" y="connsiteY2"/>
-              </a:cxn>
-              <a:cxn ang="0">
-                <a:pos x="connsiteX3" y="connsiteY3"/>
-              </a:cxn>
-              <a:cxn ang="0">
-                <a:pos x="connsiteX4" y="connsiteY4"/>
-              </a:cxn>
-              <a:cxn ang="0">
-                <a:pos x="connsiteX5" y="connsiteY5"/>
-              </a:cxn>
-              <a:cxn ang="0">
-                <a:pos x="connsiteX6" y="connsiteY6"/>
-              </a:cxn>
-              <a:cxn ang="0">
-                <a:pos x="connsiteX7" y="connsiteY7"/>
-              </a:cxn>
-              <a:cxn ang="0">
-                <a:pos x="connsiteX8" y="connsiteY8"/>
-              </a:cxn>
-              <a:cxn ang="0">
-                <a:pos x="connsiteX9" y="connsiteY9"/>
-              </a:cxn>
-              <a:cxn ang="0">
-                <a:pos x="connsiteX10" y="connsiteY10"/>
-              </a:cxn>
-              <a:cxn ang="0">
-                <a:pos x="connsiteX11" y="connsiteY11"/>
-              </a:cxn>
-              <a:cxn ang="0">
-                <a:pos x="connsiteX12" y="connsiteY12"/>
-              </a:cxn>
-              <a:cxn ang="0">
-                <a:pos x="connsiteX13" y="connsiteY13"/>
-              </a:cxn>
-              <a:cxn ang="0">
-                <a:pos x="connsiteX14" y="connsiteY14"/>
-              </a:cxn>
-              <a:cxn ang="0">
-                <a:pos x="connsiteX15" y="connsiteY15"/>
-              </a:cxn>
-              <a:cxn ang="0">
-                <a:pos x="connsiteX16" y="connsiteY16"/>
-              </a:cxn>
-              <a:cxn ang="0">
-                <a:pos x="connsiteX17" y="connsiteY17"/>
-              </a:cxn>
-              <a:cxn ang="0">
-                <a:pos x="connsiteX18" y="connsiteY18"/>
-              </a:cxn>
-              <a:cxn ang="0">
-                <a:pos x="connsiteX19" y="connsiteY19"/>
-              </a:cxn>
-              <a:cxn ang="0">
-                <a:pos x="connsiteX20" y="connsiteY20"/>
-              </a:cxn>
-              <a:cxn ang="0">
-                <a:pos x="connsiteX21" y="connsiteY21"/>
-              </a:cxn>
-              <a:cxn ang="0">
-                <a:pos x="connsiteX22" y="connsiteY22"/>
-              </a:cxn>
-              <a:cxn ang="0">
-                <a:pos x="connsiteX23" y="connsiteY23"/>
-              </a:cxn>
-              <a:cxn ang="0">
-                <a:pos x="connsiteX24" y="connsiteY24"/>
-              </a:cxn>
-              <a:cxn ang="0">
-                <a:pos x="connsiteX25" y="connsiteY25"/>
-              </a:cxn>
-              <a:cxn ang="0">
-                <a:pos x="connsiteX26" y="connsiteY26"/>
-              </a:cxn>
-              <a:cxn ang="0">
-                <a:pos x="connsiteX27" y="connsiteY27"/>
-              </a:cxn>
-              <a:cxn ang="0">
-                <a:pos x="connsiteX28" y="connsiteY28"/>
-              </a:cxn>
-              <a:cxn ang="0">
-                <a:pos x="connsiteX29" y="connsiteY29"/>
-              </a:cxn>
-              <a:cxn ang="0">
-                <a:pos x="connsiteX30" y="connsiteY30"/>
-              </a:cxn>
-              <a:cxn ang="0">
-                <a:pos x="connsiteX31" y="connsiteY31"/>
-              </a:cxn>
-              <a:cxn ang="0">
-                <a:pos x="connsiteX32" y="connsiteY32"/>
-              </a:cxn>
-              <a:cxn ang="0">
-                <a:pos x="connsiteX33" y="connsiteY33"/>
-              </a:cxn>
-              <a:cxn ang="0">
-                <a:pos x="connsiteX34" y="connsiteY34"/>
-              </a:cxn>
-              <a:cxn ang="0">
-                <a:pos x="connsiteX35" y="connsiteY35"/>
-              </a:cxn>
-              <a:cxn ang="0">
-                <a:pos x="connsiteX36" y="connsiteY36"/>
-              </a:cxn>
-              <a:cxn ang="0">
-                <a:pos x="connsiteX37" y="connsiteY37"/>
-              </a:cxn>
-              <a:cxn ang="0">
-                <a:pos x="connsiteX38" y="connsiteY38"/>
-              </a:cxn>
-              <a:cxn ang="0">
-                <a:pos x="connsiteX39" y="connsiteY39"/>
-              </a:cxn>
-              <a:cxn ang="0">
-                <a:pos x="connsiteX40" y="connsiteY40"/>
-              </a:cxn>
-              <a:cxn ang="0">
-                <a:pos x="connsiteX41" y="connsiteY41"/>
-              </a:cxn>
-              <a:cxn ang="0">
-                <a:pos x="connsiteX42" y="connsiteY42"/>
-              </a:cxn>
-              <a:cxn ang="0">
-                <a:pos x="connsiteX43" y="connsiteY43"/>
-              </a:cxn>
-              <a:cxn ang="0">
-                <a:pos x="connsiteX44" y="connsiteY44"/>
-              </a:cxn>
-              <a:cxn ang="0">
-                <a:pos x="connsiteX45" y="connsiteY45"/>
-              </a:cxn>
-              <a:cxn ang="0">
-                <a:pos x="connsiteX46" y="connsiteY46"/>
-              </a:cxn>
-              <a:cxn ang="0">
-                <a:pos x="connsiteX47" y="connsiteY47"/>
-              </a:cxn>
-              <a:cxn ang="0">
-                <a:pos x="connsiteX48" y="connsiteY48"/>
-              </a:cxn>
-              <a:cxn ang="0">
-                <a:pos x="connsiteX49" y="connsiteY49"/>
-              </a:cxn>
-              <a:cxn ang="0">
-                <a:pos x="connsiteX50" y="connsiteY50"/>
-              </a:cxn>
-              <a:cxn ang="0">
-                <a:pos x="connsiteX51" y="connsiteY51"/>
-              </a:cxn>
-              <a:cxn ang="0">
-                <a:pos x="connsiteX52" y="connsiteY52"/>
-              </a:cxn>
-              <a:cxn ang="0">
-                <a:pos x="connsiteX53" y="connsiteY53"/>
-              </a:cxn>
-              <a:cxn ang="0">
-                <a:pos x="connsiteX54" y="connsiteY54"/>
-              </a:cxn>
-              <a:cxn ang="0">
-                <a:pos x="connsiteX55" y="connsiteY55"/>
-              </a:cxn>
-              <a:cxn ang="0">
-                <a:pos x="connsiteX56" y="connsiteY56"/>
-              </a:cxn>
-              <a:cxn ang="0">
-                <a:pos x="connsiteX57" y="connsiteY57"/>
-              </a:cxn>
-              <a:cxn ang="0">
-                <a:pos x="connsiteX58" y="connsiteY58"/>
-              </a:cxn>
-              <a:cxn ang="0">
-                <a:pos x="connsiteX59" y="connsiteY59"/>
-              </a:cxn>
-              <a:cxn ang="0">
-                <a:pos x="connsiteX60" y="connsiteY60"/>
-              </a:cxn>
-              <a:cxn ang="0">
-                <a:pos x="connsiteX61" y="connsiteY61"/>
-              </a:cxn>
-              <a:cxn ang="0">
-                <a:pos x="connsiteX62" y="connsiteY62"/>
-              </a:cxn>
-              <a:cxn ang="0">
-                <a:pos x="connsiteX63" y="connsiteY63"/>
-              </a:cxn>
-              <a:cxn ang="0">
-                <a:pos x="connsiteX64" y="connsiteY64"/>
-              </a:cxn>
-              <a:cxn ang="0">
-                <a:pos x="connsiteX65" y="connsiteY65"/>
-              </a:cxn>
-              <a:cxn ang="0">
-                <a:pos x="connsiteX66" y="connsiteY66"/>
-              </a:cxn>
-              <a:cxn ang="0">
-                <a:pos x="connsiteX67" y="connsiteY67"/>
-              </a:cxn>
-              <a:cxn ang="0">
-                <a:pos x="connsiteX68" y="connsiteY68"/>
-              </a:cxn>
-              <a:cxn ang="0">
-                <a:pos x="connsiteX69" y="connsiteY69"/>
-              </a:cxn>
-              <a:cxn ang="0">
-                <a:pos x="connsiteX70" y="connsiteY70"/>
-              </a:cxn>
-              <a:cxn ang="0">
-                <a:pos x="connsiteX71" y="connsiteY71"/>
-              </a:cxn>
-              <a:cxn ang="0">
-                <a:pos x="connsiteX72" y="connsiteY72"/>
-              </a:cxn>
-              <a:cxn ang="0">
-                <a:pos x="connsiteX73" y="connsiteY73"/>
-              </a:cxn>
-              <a:cxn ang="0">
-                <a:pos x="connsiteX74" y="connsiteY74"/>
-              </a:cxn>
-              <a:cxn ang="0">
-                <a:pos x="connsiteX75" y="connsiteY75"/>
-              </a:cxn>
-              <a:cxn ang="0">
-                <a:pos x="connsiteX76" y="connsiteY76"/>
-              </a:cxn>
-              <a:cxn ang="0">
-                <a:pos x="connsiteX77" y="connsiteY77"/>
-              </a:cxn>
-              <a:cxn ang="0">
-                <a:pos x="connsiteX78" y="connsiteY78"/>
-              </a:cxn>
-              <a:cxn ang="0">
-                <a:pos x="connsiteX79" y="connsiteY79"/>
-              </a:cxn>
-              <a:cxn ang="0">
-                <a:pos x="connsiteX80" y="connsiteY80"/>
-              </a:cxn>
-              <a:cxn ang="0">
-                <a:pos x="connsiteX81" y="connsiteY81"/>
-              </a:cxn>
-              <a:cxn ang="0">
-                <a:pos x="connsiteX82" y="connsiteY82"/>
-              </a:cxn>
-              <a:cxn ang="0">
-                <a:pos x="connsiteX83" y="connsiteY83"/>
-              </a:cxn>
-              <a:cxn ang="0">
-                <a:pos x="connsiteX84" y="connsiteY84"/>
-              </a:cxn>
-              <a:cxn ang="0">
-                <a:pos x="connsiteX85" y="connsiteY85"/>
-              </a:cxn>
-              <a:cxn ang="0">
-                <a:pos x="connsiteX86" y="connsiteY86"/>
-              </a:cxn>
-              <a:cxn ang="0">
-                <a:pos x="connsiteX87" y="connsiteY87"/>
-              </a:cxn>
-              <a:cxn ang="0">
-                <a:pos x="connsiteX88" y="connsiteY88"/>
-              </a:cxn>
-              <a:cxn ang="0">
-                <a:pos x="connsiteX89" y="connsiteY89"/>
-              </a:cxn>
-              <a:cxn ang="0">
-                <a:pos x="connsiteX90" y="connsiteY90"/>
-              </a:cxn>
-              <a:cxn ang="0">
-                <a:pos x="connsiteX91" y="connsiteY91"/>
-              </a:cxn>
-              <a:cxn ang="0">
-                <a:pos x="connsiteX92" y="connsiteY92"/>
-              </a:cxn>
-              <a:cxn ang="0">
-                <a:pos x="connsiteX93" y="connsiteY93"/>
-              </a:cxn>
-              <a:cxn ang="0">
-                <a:pos x="connsiteX94" y="connsiteY94"/>
-              </a:cxn>
-              <a:cxn ang="0">
-                <a:pos x="connsiteX95" y="connsiteY95"/>
-              </a:cxn>
-              <a:cxn ang="0">
-                <a:pos x="connsiteX96" y="connsiteY96"/>
-              </a:cxn>
-              <a:cxn ang="0">
-                <a:pos x="connsiteX97" y="connsiteY97"/>
-              </a:cxn>
-              <a:cxn ang="0">
-                <a:pos x="connsiteX98" y="connsiteY98"/>
-              </a:cxn>
-              <a:cxn ang="0">
-                <a:pos x="connsiteX99" y="connsiteY99"/>
-              </a:cxn>
-              <a:cxn ang="0">
-                <a:pos x="connsiteX100" y="connsiteY100"/>
-              </a:cxn>
-              <a:cxn ang="0">
-                <a:pos x="connsiteX101" y="connsiteY101"/>
-              </a:cxn>
-              <a:cxn ang="0">
-                <a:pos x="connsiteX102" y="connsiteY102"/>
-              </a:cxn>
-              <a:cxn ang="0">
-                <a:pos x="connsiteX103" y="connsiteY103"/>
-              </a:cxn>
-              <a:cxn ang="0">
-                <a:pos x="connsiteX104" y="connsiteY104"/>
-              </a:cxn>
-              <a:cxn ang="0">
-                <a:pos x="connsiteX105" y="connsiteY105"/>
-              </a:cxn>
-              <a:cxn ang="0">
-                <a:pos x="connsiteX106" y="connsiteY106"/>
-              </a:cxn>
-              <a:cxn ang="0">
-                <a:pos x="connsiteX107" y="connsiteY107"/>
-              </a:cxn>
-              <a:cxn ang="0">
-                <a:pos x="connsiteX108" y="connsiteY108"/>
-              </a:cxn>
-              <a:cxn ang="0">
-                <a:pos x="connsiteX109" y="connsiteY109"/>
-              </a:cxn>
-              <a:cxn ang="0">
-                <a:pos x="connsiteX110" y="connsiteY110"/>
-              </a:cxn>
-              <a:cxn ang="0">
-                <a:pos x="connsiteX111" y="connsiteY111"/>
-              </a:cxn>
-              <a:cxn ang="0">
-                <a:pos x="connsiteX112" y="connsiteY112"/>
-              </a:cxn>
-              <a:cxn ang="0">
-                <a:pos x="connsiteX113" y="connsiteY113"/>
-              </a:cxn>
-              <a:cxn ang="0">
-                <a:pos x="connsiteX114" y="connsiteY114"/>
-              </a:cxn>
-              <a:cxn ang="0">
-                <a:pos x="connsiteX115" y="connsiteY115"/>
-              </a:cxn>
-              <a:cxn ang="0">
-                <a:pos x="connsiteX116" y="connsiteY116"/>
-              </a:cxn>
-              <a:cxn ang="0">
-                <a:pos x="connsiteX117" y="connsiteY117"/>
-              </a:cxn>
-              <a:cxn ang="0">
-                <a:pos x="connsiteX118" y="connsiteY118"/>
-              </a:cxn>
-              <a:cxn ang="0">
-                <a:pos x="connsiteX119" y="connsiteY119"/>
-              </a:cxn>
-              <a:cxn ang="0">
-                <a:pos x="connsiteX120" y="connsiteY120"/>
-              </a:cxn>
-              <a:cxn ang="0">
-                <a:pos x="connsiteX121" y="connsiteY121"/>
-              </a:cxn>
-              <a:cxn ang="0">
-                <a:pos x="connsiteX122" y="connsiteY122"/>
-              </a:cxn>
-              <a:cxn ang="0">
-                <a:pos x="connsiteX123" y="connsiteY123"/>
-              </a:cxn>
-              <a:cxn ang="0">
-                <a:pos x="connsiteX124" y="connsiteY124"/>
-              </a:cxn>
-              <a:cxn ang="0">
-                <a:pos x="connsiteX125" y="connsiteY125"/>
-              </a:cxn>
-              <a:cxn ang="0">
-                <a:pos x="connsiteX126" y="connsiteY126"/>
-              </a:cxn>
-              <a:cxn ang="0">
-                <a:pos x="connsiteX127" y="connsiteY127"/>
-              </a:cxn>
-              <a:cxn ang="0">
-                <a:pos x="connsiteX128" y="connsiteY128"/>
-              </a:cxn>
-              <a:cxn ang="0">
-                <a:pos x="connsiteX129" y="connsiteY129"/>
-              </a:cxn>
-              <a:cxn ang="0">
-                <a:pos x="connsiteX130" y="connsiteY130"/>
-              </a:cxn>
-              <a:cxn ang="0">
-                <a:pos x="connsiteX131" y="connsiteY131"/>
-              </a:cxn>
-              <a:cxn ang="0">
-                <a:pos x="connsiteX132" y="connsiteY132"/>
-              </a:cxn>
-              <a:cxn ang="0">
-                <a:pos x="connsiteX133" y="connsiteY133"/>
-              </a:cxn>
-              <a:cxn ang="0">
-                <a:pos x="connsiteX134" y="connsiteY134"/>
-              </a:cxn>
-              <a:cxn ang="0">
-                <a:pos x="connsiteX135" y="connsiteY135"/>
-              </a:cxn>
-              <a:cxn ang="0">
-                <a:pos x="connsiteX136" y="connsiteY136"/>
-              </a:cxn>
-              <a:cxn ang="0">
-                <a:pos x="connsiteX137" y="connsiteY137"/>
-              </a:cxn>
-              <a:cxn ang="0">
-                <a:pos x="connsiteX138" y="connsiteY138"/>
-              </a:cxn>
-              <a:cxn ang="0">
-                <a:pos x="connsiteX139" y="connsiteY139"/>
-              </a:cxn>
-              <a:cxn ang="0">
-                <a:pos x="connsiteX140" y="connsiteY140"/>
-              </a:cxn>
-              <a:cxn ang="0">
-                <a:pos x="connsiteX141" y="connsiteY141"/>
-              </a:cxn>
-              <a:cxn ang="0">
-                <a:pos x="connsiteX142" y="connsiteY142"/>
-              </a:cxn>
-              <a:cxn ang="0">
-                <a:pos x="connsiteX143" y="connsiteY143"/>
-              </a:cxn>
-              <a:cxn ang="0">
-                <a:pos x="connsiteX144" y="connsiteY144"/>
-              </a:cxn>
-              <a:cxn ang="0">
-                <a:pos x="connsiteX145" y="connsiteY145"/>
-              </a:cxn>
-              <a:cxn ang="0">
-                <a:pos x="connsiteX146" y="connsiteY146"/>
-              </a:cxn>
-              <a:cxn ang="0">
-                <a:pos x="connsiteX147" y="connsiteY147"/>
-              </a:cxn>
-              <a:cxn ang="0">
-                <a:pos x="connsiteX148" y="connsiteY148"/>
-              </a:cxn>
-              <a:cxn ang="0">
-                <a:pos x="connsiteX149" y="connsiteY149"/>
-              </a:cxn>
-              <a:cxn ang="0">
-                <a:pos x="connsiteX150" y="connsiteY150"/>
-              </a:cxn>
-              <a:cxn ang="0">
-                <a:pos x="connsiteX151" y="connsiteY151"/>
-              </a:cxn>
-              <a:cxn ang="0">
-                <a:pos x="connsiteX152" y="connsiteY152"/>
-              </a:cxn>
-              <a:cxn ang="0">
-                <a:pos x="connsiteX153" y="connsiteY153"/>
-              </a:cxn>
-              <a:cxn ang="0">
-                <a:pos x="connsiteX154" y="connsiteY154"/>
-              </a:cxn>
-            </a:cxnLst>
-            <a:rect l="l" t="t" r="r" b="b"/>
-            <a:pathLst>
-              <a:path w="6494710" h="1995054">
-                <a:moveTo>
-                  <a:pt x="1828800" y="0"/>
-                </a:moveTo>
-                <a:cubicBezTo>
-                  <a:pt x="1809743" y="23821"/>
-                  <a:pt x="1798805" y="46106"/>
-                  <a:pt x="1770611" y="58189"/>
-                </a:cubicBezTo>
-                <a:cubicBezTo>
-                  <a:pt x="1760110" y="62689"/>
-                  <a:pt x="1748303" y="63219"/>
-                  <a:pt x="1737360" y="66502"/>
-                </a:cubicBezTo>
-                <a:cubicBezTo>
-                  <a:pt x="1720574" y="71538"/>
-                  <a:pt x="1704109" y="77585"/>
-                  <a:pt x="1687484" y="83127"/>
-                </a:cubicBezTo>
-                <a:cubicBezTo>
-                  <a:pt x="1679171" y="85898"/>
-                  <a:pt x="1669976" y="86796"/>
-                  <a:pt x="1662546" y="91440"/>
-                </a:cubicBezTo>
-                <a:cubicBezTo>
-                  <a:pt x="1640379" y="105295"/>
-                  <a:pt x="1620315" y="123296"/>
-                  <a:pt x="1596044" y="133004"/>
-                </a:cubicBezTo>
-                <a:cubicBezTo>
-                  <a:pt x="1568498" y="144022"/>
-                  <a:pt x="1533064" y="159139"/>
-                  <a:pt x="1504604" y="166254"/>
-                </a:cubicBezTo>
-                <a:cubicBezTo>
-                  <a:pt x="1493520" y="169025"/>
-                  <a:pt x="1482050" y="170555"/>
-                  <a:pt x="1471353" y="174567"/>
-                </a:cubicBezTo>
-                <a:cubicBezTo>
-                  <a:pt x="1402551" y="200369"/>
-                  <a:pt x="1477968" y="185382"/>
-                  <a:pt x="1388226" y="207818"/>
-                </a:cubicBezTo>
-                <a:cubicBezTo>
-                  <a:pt x="1284225" y="233819"/>
-                  <a:pt x="1413556" y="200582"/>
-                  <a:pt x="1330037" y="224444"/>
-                </a:cubicBezTo>
-                <a:cubicBezTo>
-                  <a:pt x="1319052" y="227583"/>
-                  <a:pt x="1307624" y="229143"/>
-                  <a:pt x="1296786" y="232756"/>
-                </a:cubicBezTo>
-                <a:cubicBezTo>
-                  <a:pt x="1282630" y="237475"/>
-                  <a:pt x="1268569" y="242709"/>
-                  <a:pt x="1255222" y="249382"/>
-                </a:cubicBezTo>
-                <a:cubicBezTo>
-                  <a:pt x="1246286" y="253850"/>
-                  <a:pt x="1239638" y="262499"/>
-                  <a:pt x="1230284" y="266007"/>
-                </a:cubicBezTo>
-                <a:cubicBezTo>
-                  <a:pt x="1217055" y="270968"/>
-                  <a:pt x="1202427" y="270893"/>
-                  <a:pt x="1188720" y="274320"/>
-                </a:cubicBezTo>
-                <a:cubicBezTo>
-                  <a:pt x="1132076" y="288481"/>
-                  <a:pt x="1201886" y="278689"/>
-                  <a:pt x="1122219" y="290945"/>
-                </a:cubicBezTo>
-                <a:cubicBezTo>
-                  <a:pt x="1100139" y="294342"/>
-                  <a:pt x="1077861" y="296305"/>
-                  <a:pt x="1055717" y="299258"/>
-                </a:cubicBezTo>
-                <a:lnTo>
-                  <a:pt x="997528" y="307571"/>
-                </a:lnTo>
-                <a:lnTo>
-                  <a:pt x="299259" y="299258"/>
-                </a:lnTo>
-                <a:cubicBezTo>
-                  <a:pt x="124951" y="295626"/>
-                  <a:pt x="267626" y="282430"/>
-                  <a:pt x="133004" y="299258"/>
-                </a:cubicBezTo>
-                <a:cubicBezTo>
-                  <a:pt x="124691" y="302029"/>
-                  <a:pt x="115580" y="303063"/>
-                  <a:pt x="108066" y="307571"/>
-                </a:cubicBezTo>
-                <a:cubicBezTo>
-                  <a:pt x="94903" y="315469"/>
-                  <a:pt x="82368" y="337805"/>
-                  <a:pt x="74815" y="349134"/>
-                </a:cubicBezTo>
-                <a:cubicBezTo>
-                  <a:pt x="68735" y="379536"/>
-                  <a:pt x="63938" y="412453"/>
-                  <a:pt x="49877" y="440574"/>
-                </a:cubicBezTo>
-                <a:cubicBezTo>
-                  <a:pt x="36247" y="467834"/>
-                  <a:pt x="32280" y="471847"/>
-                  <a:pt x="24939" y="498764"/>
-                </a:cubicBezTo>
-                <a:cubicBezTo>
-                  <a:pt x="18927" y="520808"/>
-                  <a:pt x="8313" y="565265"/>
-                  <a:pt x="8313" y="565265"/>
-                </a:cubicBezTo>
-                <a:cubicBezTo>
-                  <a:pt x="5542" y="775854"/>
-                  <a:pt x="0" y="986425"/>
-                  <a:pt x="0" y="1197033"/>
-                </a:cubicBezTo>
-                <a:cubicBezTo>
-                  <a:pt x="0" y="1263592"/>
-                  <a:pt x="3885" y="1330126"/>
-                  <a:pt x="8313" y="1396538"/>
-                </a:cubicBezTo>
-                <a:cubicBezTo>
-                  <a:pt x="9377" y="1412490"/>
-                  <a:pt x="21345" y="1470008"/>
-                  <a:pt x="24939" y="1487978"/>
-                </a:cubicBezTo>
-                <a:cubicBezTo>
-                  <a:pt x="27710" y="1601585"/>
-                  <a:pt x="28617" y="1715253"/>
-                  <a:pt x="33251" y="1828800"/>
-                </a:cubicBezTo>
-                <a:cubicBezTo>
-                  <a:pt x="34162" y="1851121"/>
-                  <a:pt x="32202" y="1875018"/>
-                  <a:pt x="41564" y="1895302"/>
-                </a:cubicBezTo>
-                <a:cubicBezTo>
-                  <a:pt x="49775" y="1913092"/>
-                  <a:pt x="66826" y="1925996"/>
-                  <a:pt x="83128" y="1936865"/>
-                </a:cubicBezTo>
-                <a:cubicBezTo>
-                  <a:pt x="91441" y="1942407"/>
-                  <a:pt x="99130" y="1949023"/>
-                  <a:pt x="108066" y="1953491"/>
-                </a:cubicBezTo>
-                <a:cubicBezTo>
-                  <a:pt x="115903" y="1957410"/>
-                  <a:pt x="124503" y="1959679"/>
-                  <a:pt x="133004" y="1961804"/>
-                </a:cubicBezTo>
-                <a:cubicBezTo>
-                  <a:pt x="160366" y="1968644"/>
-                  <a:pt x="197289" y="1973492"/>
-                  <a:pt x="224444" y="1978429"/>
-                </a:cubicBezTo>
-                <a:cubicBezTo>
-                  <a:pt x="313568" y="1994634"/>
-                  <a:pt x="212711" y="1979129"/>
-                  <a:pt x="324197" y="1995054"/>
-                </a:cubicBezTo>
-                <a:cubicBezTo>
-                  <a:pt x="432262" y="1992283"/>
-                  <a:pt x="540409" y="1991764"/>
-                  <a:pt x="648393" y="1986742"/>
-                </a:cubicBezTo>
-                <a:cubicBezTo>
-                  <a:pt x="659805" y="1986211"/>
-                  <a:pt x="670473" y="1980823"/>
-                  <a:pt x="681644" y="1978429"/>
-                </a:cubicBezTo>
-                <a:cubicBezTo>
-                  <a:pt x="723090" y="1969548"/>
-                  <a:pt x="764771" y="1961804"/>
-                  <a:pt x="806335" y="1953491"/>
-                </a:cubicBezTo>
-                <a:cubicBezTo>
-                  <a:pt x="820190" y="1950720"/>
-                  <a:pt x="833771" y="1945355"/>
-                  <a:pt x="847899" y="1945178"/>
-                </a:cubicBezTo>
-                <a:lnTo>
-                  <a:pt x="1512917" y="1936865"/>
-                </a:lnTo>
-                <a:cubicBezTo>
-                  <a:pt x="1726307" y="1901303"/>
-                  <a:pt x="1358548" y="1961895"/>
-                  <a:pt x="1629295" y="1920240"/>
-                </a:cubicBezTo>
-                <a:cubicBezTo>
-                  <a:pt x="1643260" y="1918092"/>
-                  <a:pt x="1656779" y="1913100"/>
-                  <a:pt x="1670859" y="1911927"/>
-                </a:cubicBezTo>
-                <a:cubicBezTo>
-                  <a:pt x="1723397" y="1907549"/>
-                  <a:pt x="1776171" y="1906710"/>
-                  <a:pt x="1828800" y="1903614"/>
-                </a:cubicBezTo>
-                <a:cubicBezTo>
-                  <a:pt x="1936265" y="1897293"/>
-                  <a:pt x="1952444" y="1895389"/>
-                  <a:pt x="2053244" y="1886989"/>
-                </a:cubicBezTo>
-                <a:cubicBezTo>
-                  <a:pt x="2122463" y="1869684"/>
-                  <a:pt x="2049607" y="1886321"/>
-                  <a:pt x="2161309" y="1870364"/>
-                </a:cubicBezTo>
-                <a:cubicBezTo>
-                  <a:pt x="2175296" y="1868366"/>
-                  <a:pt x="2188868" y="1863918"/>
-                  <a:pt x="2202873" y="1862051"/>
-                </a:cubicBezTo>
-                <a:cubicBezTo>
-                  <a:pt x="2230476" y="1858370"/>
-                  <a:pt x="2258291" y="1856509"/>
-                  <a:pt x="2286000" y="1853738"/>
-                </a:cubicBezTo>
-                <a:cubicBezTo>
-                  <a:pt x="2369127" y="1856509"/>
-                  <a:pt x="2452361" y="1857019"/>
-                  <a:pt x="2535382" y="1862051"/>
-                </a:cubicBezTo>
-                <a:cubicBezTo>
-                  <a:pt x="2544128" y="1862581"/>
-                  <a:pt x="2551895" y="1867957"/>
-                  <a:pt x="2560320" y="1870364"/>
-                </a:cubicBezTo>
-                <a:cubicBezTo>
-                  <a:pt x="2600630" y="1881881"/>
-                  <a:pt x="2590591" y="1876710"/>
-                  <a:pt x="2635135" y="1886989"/>
-                </a:cubicBezTo>
-                <a:cubicBezTo>
-                  <a:pt x="2657399" y="1892127"/>
-                  <a:pt x="2679470" y="1898072"/>
-                  <a:pt x="2701637" y="1903614"/>
-                </a:cubicBezTo>
-                <a:cubicBezTo>
-                  <a:pt x="2712721" y="1906385"/>
-                  <a:pt x="2723619" y="1910049"/>
-                  <a:pt x="2734888" y="1911927"/>
-                </a:cubicBezTo>
-                <a:lnTo>
-                  <a:pt x="2834640" y="1928553"/>
-                </a:lnTo>
-                <a:cubicBezTo>
-                  <a:pt x="2887287" y="1925782"/>
-                  <a:pt x="2940269" y="1926779"/>
-                  <a:pt x="2992582" y="1920240"/>
-                </a:cubicBezTo>
-                <a:cubicBezTo>
-                  <a:pt x="3007389" y="1918389"/>
-                  <a:pt x="3019670" y="1907233"/>
-                  <a:pt x="3034146" y="1903614"/>
-                </a:cubicBezTo>
-                <a:cubicBezTo>
-                  <a:pt x="3053154" y="1898862"/>
-                  <a:pt x="3073058" y="1898807"/>
-                  <a:pt x="3092335" y="1895302"/>
-                </a:cubicBezTo>
-                <a:cubicBezTo>
-                  <a:pt x="3103576" y="1893258"/>
-                  <a:pt x="3114214" y="1888089"/>
-                  <a:pt x="3125586" y="1886989"/>
-                </a:cubicBezTo>
-                <a:cubicBezTo>
-                  <a:pt x="3200256" y="1879763"/>
-                  <a:pt x="3275382" y="1877829"/>
-                  <a:pt x="3350029" y="1870364"/>
-                </a:cubicBezTo>
-                <a:lnTo>
-                  <a:pt x="3433157" y="1862051"/>
-                </a:lnTo>
-                <a:cubicBezTo>
-                  <a:pt x="3444241" y="1859280"/>
-                  <a:pt x="3455255" y="1856216"/>
-                  <a:pt x="3466408" y="1853738"/>
-                </a:cubicBezTo>
-                <a:cubicBezTo>
-                  <a:pt x="3480200" y="1850673"/>
-                  <a:pt x="3494264" y="1848852"/>
-                  <a:pt x="3507971" y="1845425"/>
-                </a:cubicBezTo>
-                <a:cubicBezTo>
-                  <a:pt x="3538621" y="1837762"/>
-                  <a:pt x="3569256" y="1829910"/>
-                  <a:pt x="3599411" y="1820487"/>
-                </a:cubicBezTo>
-                <a:cubicBezTo>
-                  <a:pt x="3654353" y="1803318"/>
-                  <a:pt x="3643629" y="1796151"/>
-                  <a:pt x="3707477" y="1770611"/>
-                </a:cubicBezTo>
-                <a:cubicBezTo>
-                  <a:pt x="3721331" y="1765069"/>
-                  <a:pt x="3735694" y="1760658"/>
-                  <a:pt x="3749040" y="1753985"/>
-                </a:cubicBezTo>
-                <a:cubicBezTo>
-                  <a:pt x="3769094" y="1743958"/>
-                  <a:pt x="3795758" y="1725611"/>
-                  <a:pt x="3815542" y="1712422"/>
-                </a:cubicBezTo>
-                <a:cubicBezTo>
-                  <a:pt x="3862732" y="1724218"/>
-                  <a:pt x="3860495" y="1721104"/>
-                  <a:pt x="3915295" y="1753985"/>
-                </a:cubicBezTo>
-                <a:cubicBezTo>
-                  <a:pt x="3929150" y="1762298"/>
-                  <a:pt x="3943158" y="1770361"/>
-                  <a:pt x="3956859" y="1778924"/>
-                </a:cubicBezTo>
-                <a:cubicBezTo>
-                  <a:pt x="3965331" y="1784219"/>
-                  <a:pt x="3972614" y="1791614"/>
-                  <a:pt x="3981797" y="1795549"/>
-                </a:cubicBezTo>
-                <a:cubicBezTo>
-                  <a:pt x="3992298" y="1800049"/>
-                  <a:pt x="4004311" y="1799958"/>
-                  <a:pt x="4015048" y="1803862"/>
-                </a:cubicBezTo>
-                <a:cubicBezTo>
-                  <a:pt x="4034880" y="1811074"/>
-                  <a:pt x="4053364" y="1821703"/>
-                  <a:pt x="4073237" y="1828800"/>
-                </a:cubicBezTo>
-                <a:cubicBezTo>
-                  <a:pt x="4092234" y="1835585"/>
-                  <a:pt x="4112289" y="1839046"/>
-                  <a:pt x="4131426" y="1845425"/>
-                </a:cubicBezTo>
-                <a:cubicBezTo>
-                  <a:pt x="4207537" y="1870796"/>
-                  <a:pt x="4138104" y="1853085"/>
-                  <a:pt x="4222866" y="1886989"/>
-                </a:cubicBezTo>
-                <a:cubicBezTo>
-                  <a:pt x="4233474" y="1891232"/>
-                  <a:pt x="4244964" y="1892824"/>
-                  <a:pt x="4256117" y="1895302"/>
-                </a:cubicBezTo>
-                <a:cubicBezTo>
-                  <a:pt x="4351097" y="1916408"/>
-                  <a:pt x="4249838" y="1891653"/>
-                  <a:pt x="4330931" y="1911927"/>
-                </a:cubicBezTo>
-                <a:cubicBezTo>
-                  <a:pt x="4369724" y="1909156"/>
-                  <a:pt x="4408655" y="1907909"/>
-                  <a:pt x="4447309" y="1903614"/>
-                </a:cubicBezTo>
-                <a:cubicBezTo>
-                  <a:pt x="4458664" y="1902352"/>
-                  <a:pt x="4469389" y="1897696"/>
-                  <a:pt x="4480560" y="1895302"/>
-                </a:cubicBezTo>
-                <a:cubicBezTo>
-                  <a:pt x="4508191" y="1889381"/>
-                  <a:pt x="4536880" y="1887611"/>
-                  <a:pt x="4563688" y="1878676"/>
-                </a:cubicBezTo>
-                <a:cubicBezTo>
-                  <a:pt x="4597700" y="1867339"/>
-                  <a:pt x="4593285" y="1867371"/>
-                  <a:pt x="4638502" y="1862051"/>
-                </a:cubicBezTo>
-                <a:cubicBezTo>
-                  <a:pt x="4725003" y="1851874"/>
-                  <a:pt x="4770773" y="1852515"/>
-                  <a:pt x="4862946" y="1845425"/>
-                </a:cubicBezTo>
-                <a:cubicBezTo>
-                  <a:pt x="4926729" y="1840519"/>
-                  <a:pt x="5054139" y="1828800"/>
-                  <a:pt x="5054139" y="1828800"/>
-                </a:cubicBezTo>
-                <a:cubicBezTo>
-                  <a:pt x="5184372" y="1834342"/>
-                  <a:pt x="5314902" y="1835030"/>
-                  <a:pt x="5444837" y="1845425"/>
-                </a:cubicBezTo>
-                <a:cubicBezTo>
-                  <a:pt x="5454796" y="1846222"/>
-                  <a:pt x="5460839" y="1857583"/>
-                  <a:pt x="5469775" y="1862051"/>
-                </a:cubicBezTo>
-                <a:cubicBezTo>
-                  <a:pt x="5477612" y="1865970"/>
-                  <a:pt x="5486876" y="1866445"/>
-                  <a:pt x="5494713" y="1870364"/>
-                </a:cubicBezTo>
-                <a:cubicBezTo>
-                  <a:pt x="5503649" y="1874832"/>
-                  <a:pt x="5510468" y="1883054"/>
-                  <a:pt x="5519651" y="1886989"/>
-                </a:cubicBezTo>
-                <a:cubicBezTo>
-                  <a:pt x="5530152" y="1891489"/>
-                  <a:pt x="5541959" y="1892019"/>
-                  <a:pt x="5552902" y="1895302"/>
-                </a:cubicBezTo>
-                <a:cubicBezTo>
-                  <a:pt x="5635233" y="1920001"/>
-                  <a:pt x="5569658" y="1906407"/>
-                  <a:pt x="5652655" y="1920240"/>
-                </a:cubicBezTo>
-                <a:cubicBezTo>
-                  <a:pt x="5666510" y="1925782"/>
-                  <a:pt x="5679743" y="1933246"/>
-                  <a:pt x="5694219" y="1936865"/>
-                </a:cubicBezTo>
-                <a:cubicBezTo>
-                  <a:pt x="5765522" y="1954691"/>
-                  <a:pt x="5837983" y="1940674"/>
-                  <a:pt x="5910349" y="1936865"/>
-                </a:cubicBezTo>
-                <a:cubicBezTo>
-                  <a:pt x="5918662" y="1931323"/>
-                  <a:pt x="5927158" y="1926047"/>
-                  <a:pt x="5935288" y="1920240"/>
-                </a:cubicBezTo>
-                <a:cubicBezTo>
-                  <a:pt x="5962473" y="1900823"/>
-                  <a:pt x="5975066" y="1884859"/>
-                  <a:pt x="6010102" y="1878676"/>
-                </a:cubicBezTo>
-                <a:cubicBezTo>
-                  <a:pt x="6042961" y="1872877"/>
-                  <a:pt x="6076515" y="1871698"/>
-                  <a:pt x="6109855" y="1870364"/>
-                </a:cubicBezTo>
-                <a:cubicBezTo>
-                  <a:pt x="6215102" y="1866154"/>
-                  <a:pt x="6320444" y="1864822"/>
-                  <a:pt x="6425739" y="1862051"/>
-                </a:cubicBezTo>
-                <a:cubicBezTo>
-                  <a:pt x="6434052" y="1856509"/>
-                  <a:pt x="6442205" y="1850720"/>
-                  <a:pt x="6450677" y="1845425"/>
-                </a:cubicBezTo>
-                <a:cubicBezTo>
-                  <a:pt x="6464378" y="1836862"/>
-                  <a:pt x="6487131" y="1835815"/>
-                  <a:pt x="6492240" y="1820487"/>
-                </a:cubicBezTo>
-                <a:cubicBezTo>
-                  <a:pt x="6500175" y="1796683"/>
-                  <a:pt x="6486699" y="1770611"/>
-                  <a:pt x="6483928" y="1745673"/>
-                </a:cubicBezTo>
-                <a:cubicBezTo>
-                  <a:pt x="6481157" y="1651462"/>
-                  <a:pt x="6480442" y="1557168"/>
-                  <a:pt x="6475615" y="1463040"/>
-                </a:cubicBezTo>
-                <a:cubicBezTo>
-                  <a:pt x="6474748" y="1446126"/>
-                  <a:pt x="6458272" y="1382992"/>
-                  <a:pt x="6450677" y="1371600"/>
-                </a:cubicBezTo>
-                <a:lnTo>
-                  <a:pt x="6434051" y="1346662"/>
-                </a:lnTo>
-                <a:cubicBezTo>
-                  <a:pt x="6431280" y="1338349"/>
-                  <a:pt x="6430247" y="1329238"/>
-                  <a:pt x="6425739" y="1321724"/>
-                </a:cubicBezTo>
-                <a:cubicBezTo>
-                  <a:pt x="6419112" y="1310678"/>
-                  <a:pt x="6393884" y="1293328"/>
-                  <a:pt x="6384175" y="1288473"/>
-                </a:cubicBezTo>
-                <a:cubicBezTo>
-                  <a:pt x="6376338" y="1284554"/>
-                  <a:pt x="6367441" y="1283237"/>
-                  <a:pt x="6359237" y="1280160"/>
-                </a:cubicBezTo>
-                <a:cubicBezTo>
-                  <a:pt x="6345265" y="1274920"/>
-                  <a:pt x="6331528" y="1269076"/>
-                  <a:pt x="6317673" y="1263534"/>
-                </a:cubicBezTo>
-                <a:lnTo>
-                  <a:pt x="5694219" y="1271847"/>
-                </a:lnTo>
-                <a:cubicBezTo>
-                  <a:pt x="5549291" y="1276522"/>
-                  <a:pt x="5575336" y="1287118"/>
-                  <a:pt x="5461462" y="1305098"/>
-                </a:cubicBezTo>
-                <a:cubicBezTo>
-                  <a:pt x="5436678" y="1309011"/>
-                  <a:pt x="5411568" y="1310479"/>
-                  <a:pt x="5386648" y="1313411"/>
-                </a:cubicBezTo>
-                <a:lnTo>
-                  <a:pt x="5320146" y="1321724"/>
-                </a:lnTo>
-                <a:cubicBezTo>
-                  <a:pt x="5114368" y="1380516"/>
-                  <a:pt x="5406980" y="1299768"/>
-                  <a:pt x="5203768" y="1346662"/>
-                </a:cubicBezTo>
-                <a:cubicBezTo>
-                  <a:pt x="5066935" y="1378239"/>
-                  <a:pt x="5261728" y="1351305"/>
-                  <a:pt x="5079077" y="1371600"/>
-                </a:cubicBezTo>
-                <a:cubicBezTo>
-                  <a:pt x="5037513" y="1366058"/>
-                  <a:pt x="4995747" y="1361867"/>
-                  <a:pt x="4954386" y="1354974"/>
-                </a:cubicBezTo>
-                <a:cubicBezTo>
-                  <a:pt x="4945743" y="1353534"/>
-                  <a:pt x="4937949" y="1348787"/>
-                  <a:pt x="4929448" y="1346662"/>
-                </a:cubicBezTo>
-                <a:cubicBezTo>
-                  <a:pt x="4915741" y="1343235"/>
-                  <a:pt x="4901591" y="1341776"/>
-                  <a:pt x="4887884" y="1338349"/>
-                </a:cubicBezTo>
-                <a:cubicBezTo>
-                  <a:pt x="4879383" y="1336224"/>
-                  <a:pt x="4871648" y="1331060"/>
-                  <a:pt x="4862946" y="1330036"/>
-                </a:cubicBezTo>
-                <a:cubicBezTo>
-                  <a:pt x="4824321" y="1325492"/>
-                  <a:pt x="4785361" y="1324495"/>
-                  <a:pt x="4746568" y="1321724"/>
-                </a:cubicBezTo>
-                <a:cubicBezTo>
-                  <a:pt x="4729942" y="1316182"/>
-                  <a:pt x="4713693" y="1309349"/>
-                  <a:pt x="4696691" y="1305098"/>
-                </a:cubicBezTo>
-                <a:cubicBezTo>
-                  <a:pt x="4638591" y="1290573"/>
-                  <a:pt x="4619706" y="1287004"/>
-                  <a:pt x="4547062" y="1255222"/>
-                </a:cubicBezTo>
-                <a:cubicBezTo>
-                  <a:pt x="4502728" y="1235826"/>
-                  <a:pt x="4457342" y="1218674"/>
-                  <a:pt x="4414059" y="1197033"/>
-                </a:cubicBezTo>
-                <a:cubicBezTo>
-                  <a:pt x="4391892" y="1185949"/>
-                  <a:pt x="4370474" y="1173218"/>
-                  <a:pt x="4347557" y="1163782"/>
-                </a:cubicBezTo>
-                <a:cubicBezTo>
-                  <a:pt x="4323250" y="1153773"/>
-                  <a:pt x="4297242" y="1148372"/>
-                  <a:pt x="4272742" y="1138844"/>
-                </a:cubicBezTo>
-                <a:cubicBezTo>
-                  <a:pt x="4247307" y="1128953"/>
-                  <a:pt x="4223444" y="1115272"/>
-                  <a:pt x="4197928" y="1105593"/>
-                </a:cubicBezTo>
-                <a:cubicBezTo>
-                  <a:pt x="4143030" y="1084770"/>
-                  <a:pt x="4086541" y="1068306"/>
-                  <a:pt x="4031673" y="1047404"/>
-                </a:cubicBezTo>
-                <a:cubicBezTo>
-                  <a:pt x="3973484" y="1025237"/>
-                  <a:pt x="3913793" y="1006669"/>
-                  <a:pt x="3857106" y="980902"/>
-                </a:cubicBezTo>
-                <a:cubicBezTo>
-                  <a:pt x="3826626" y="967047"/>
-                  <a:pt x="3796673" y="951970"/>
-                  <a:pt x="3765666" y="939338"/>
-                </a:cubicBezTo>
-                <a:cubicBezTo>
-                  <a:pt x="3721816" y="921473"/>
-                  <a:pt x="3676183" y="908114"/>
-                  <a:pt x="3632662" y="889462"/>
-                </a:cubicBezTo>
-                <a:cubicBezTo>
-                  <a:pt x="3593869" y="872836"/>
-                  <a:pt x="3556324" y="852931"/>
-                  <a:pt x="3516284" y="839585"/>
-                </a:cubicBezTo>
-                <a:cubicBezTo>
-                  <a:pt x="3507971" y="836814"/>
-                  <a:pt x="3499434" y="834643"/>
-                  <a:pt x="3491346" y="831273"/>
-                </a:cubicBezTo>
-                <a:cubicBezTo>
-                  <a:pt x="3466155" y="820777"/>
-                  <a:pt x="3441722" y="808518"/>
-                  <a:pt x="3416531" y="798022"/>
-                </a:cubicBezTo>
-                <a:cubicBezTo>
-                  <a:pt x="3408443" y="794652"/>
-                  <a:pt x="3399430" y="793628"/>
-                  <a:pt x="3391593" y="789709"/>
-                </a:cubicBezTo>
-                <a:cubicBezTo>
-                  <a:pt x="3382657" y="785241"/>
-                  <a:pt x="3376044" y="776498"/>
-                  <a:pt x="3366655" y="773084"/>
-                </a:cubicBezTo>
-                <a:cubicBezTo>
-                  <a:pt x="3345181" y="765275"/>
-                  <a:pt x="3322123" y="762735"/>
-                  <a:pt x="3300153" y="756458"/>
-                </a:cubicBezTo>
-                <a:cubicBezTo>
-                  <a:pt x="3283303" y="751644"/>
-                  <a:pt x="3250277" y="739833"/>
-                  <a:pt x="3250277" y="739833"/>
-                </a:cubicBezTo>
-                <a:cubicBezTo>
-                  <a:pt x="3178819" y="692192"/>
-                  <a:pt x="3269224" y="749305"/>
-                  <a:pt x="3200400" y="714894"/>
-                </a:cubicBezTo>
-                <a:cubicBezTo>
-                  <a:pt x="3191464" y="710426"/>
-                  <a:pt x="3184233" y="703053"/>
-                  <a:pt x="3175462" y="698269"/>
-                </a:cubicBezTo>
-                <a:cubicBezTo>
-                  <a:pt x="3153704" y="686401"/>
-                  <a:pt x="3129977" y="678154"/>
-                  <a:pt x="3108960" y="665018"/>
-                </a:cubicBezTo>
-                <a:cubicBezTo>
-                  <a:pt x="3086793" y="651163"/>
-                  <a:pt x="3064210" y="637954"/>
-                  <a:pt x="3042459" y="623454"/>
-                </a:cubicBezTo>
-                <a:cubicBezTo>
-                  <a:pt x="3017605" y="606885"/>
-                  <a:pt x="2988540" y="584532"/>
-                  <a:pt x="2959331" y="573578"/>
-                </a:cubicBezTo>
-                <a:cubicBezTo>
-                  <a:pt x="2948634" y="569566"/>
-                  <a:pt x="2937065" y="568404"/>
-                  <a:pt x="2926080" y="565265"/>
-                </a:cubicBezTo>
-                <a:cubicBezTo>
-                  <a:pt x="2917655" y="562858"/>
-                  <a:pt x="2909567" y="559360"/>
-                  <a:pt x="2901142" y="556953"/>
-                </a:cubicBezTo>
-                <a:cubicBezTo>
-                  <a:pt x="2890157" y="553814"/>
-                  <a:pt x="2878729" y="552253"/>
-                  <a:pt x="2867891" y="548640"/>
-                </a:cubicBezTo>
-                <a:cubicBezTo>
-                  <a:pt x="2853735" y="543921"/>
-                  <a:pt x="2839876" y="538267"/>
-                  <a:pt x="2826328" y="532014"/>
-                </a:cubicBezTo>
-                <a:cubicBezTo>
-                  <a:pt x="2803825" y="521628"/>
-                  <a:pt x="2783870" y="504775"/>
-                  <a:pt x="2759826" y="498764"/>
-                </a:cubicBezTo>
-                <a:cubicBezTo>
-                  <a:pt x="2674467" y="477424"/>
-                  <a:pt x="2780274" y="506431"/>
-                  <a:pt x="2693324" y="473825"/>
-                </a:cubicBezTo>
-                <a:cubicBezTo>
-                  <a:pt x="2682627" y="469814"/>
-                  <a:pt x="2671157" y="468284"/>
-                  <a:pt x="2660073" y="465513"/>
-                </a:cubicBezTo>
-                <a:cubicBezTo>
-                  <a:pt x="2651760" y="459971"/>
-                  <a:pt x="2644411" y="452597"/>
-                  <a:pt x="2635135" y="448887"/>
-                </a:cubicBezTo>
-                <a:cubicBezTo>
-                  <a:pt x="2565252" y="420934"/>
-                  <a:pt x="2594764" y="447703"/>
-                  <a:pt x="2552008" y="415636"/>
-                </a:cubicBezTo>
-                <a:cubicBezTo>
-                  <a:pt x="2526733" y="396680"/>
-                  <a:pt x="2505451" y="371576"/>
-                  <a:pt x="2477193" y="357447"/>
-                </a:cubicBezTo>
-                <a:cubicBezTo>
-                  <a:pt x="2449575" y="343638"/>
-                  <a:pt x="2442507" y="341823"/>
-                  <a:pt x="2419004" y="324196"/>
-                </a:cubicBezTo>
-                <a:cubicBezTo>
-                  <a:pt x="2406767" y="315018"/>
-                  <a:pt x="2371296" y="283717"/>
-                  <a:pt x="2352502" y="274320"/>
-                </a:cubicBezTo>
-                <a:cubicBezTo>
-                  <a:pt x="2344665" y="270401"/>
-                  <a:pt x="2335877" y="268778"/>
-                  <a:pt x="2327564" y="266007"/>
-                </a:cubicBezTo>
-                <a:cubicBezTo>
-                  <a:pt x="2320032" y="260358"/>
-                  <a:pt x="2281531" y="230522"/>
-                  <a:pt x="2269375" y="224444"/>
-                </a:cubicBezTo>
-                <a:cubicBezTo>
-                  <a:pt x="2257448" y="218481"/>
-                  <a:pt x="2221841" y="210482"/>
-                  <a:pt x="2211186" y="207818"/>
-                </a:cubicBezTo>
-                <a:cubicBezTo>
-                  <a:pt x="2202873" y="202276"/>
-                  <a:pt x="2195431" y="195128"/>
-                  <a:pt x="2186248" y="191193"/>
-                </a:cubicBezTo>
-                <a:cubicBezTo>
-                  <a:pt x="2163162" y="181299"/>
-                  <a:pt x="2102078" y="176793"/>
-                  <a:pt x="2086495" y="174567"/>
-                </a:cubicBezTo>
-                <a:cubicBezTo>
-                  <a:pt x="2064237" y="171387"/>
-                  <a:pt x="2018312" y="163309"/>
-                  <a:pt x="1995055" y="157942"/>
-                </a:cubicBezTo>
-                <a:cubicBezTo>
-                  <a:pt x="1972791" y="152804"/>
-                  <a:pt x="1951379" y="142353"/>
-                  <a:pt x="1928553" y="141316"/>
-                </a:cubicBezTo>
-                <a:lnTo>
-                  <a:pt x="1745673" y="133004"/>
-                </a:lnTo>
-                <a:cubicBezTo>
-                  <a:pt x="1689685" y="142335"/>
-                  <a:pt x="1703335" y="126241"/>
-                  <a:pt x="1687484" y="157942"/>
-                </a:cubicBezTo>
-              </a:path>
-            </a:pathLst>
-          </a:custGeom>
-          <a:noFill/>
-        </p:spPr>
-        <p:style>
-          <a:lnRef idx="2">
-            <a:schemeClr val="accent1">
-              <a:shade val="50000"/>
-            </a:schemeClr>
-          </a:lnRef>
-          <a:fillRef idx="1">
-            <a:schemeClr val="accent1"/>
-          </a:fillRef>
-          <a:effectRef idx="0">
-            <a:schemeClr val="accent1"/>
-          </a:effectRef>
-          <a:fontRef idx="minor">
-            <a:schemeClr val="lt1"/>
-          </a:fontRef>
-        </p:style>
-        <p:txBody>
-          <a:bodyPr rtlCol="0" anchor="ctr"/>
-          <a:lstStyle/>
-          <a:p>
-            <a:pPr algn="ctr"/>
-            <a:endParaRPr lang="en-US"/>
-          </a:p>
-        </p:txBody>
-      </p:sp>
     </p:spTree>
     <p:extLst>
       <p:ext uri="{BB962C8B-B14F-4D97-AF65-F5344CB8AC3E}">

</xml_diff>